<commit_message>
tiny edit to Main pptx
</commit_message>
<xml_diff>
--- a/Dublin-Java-8-Main.pptx
+++ b/Dublin-Java-8-Main.pptx
@@ -351,11 +351,11 @@
   <p:clrMapOvr>
     <a:masterClrMapping/>
   </p:clrMapOvr>
-  <mc:AlternateContent xmlns:mc="http://schemas.openxmlformats.org/markup-compatibility/2006">
-    <mc:Choice xmlns:p14="http://schemas.microsoft.com/office/powerpoint/2010/main" Requires="p14">
+  <mc:AlternateContent xmlns:mc="http://schemas.openxmlformats.org/markup-compatibility/2006" xmlns:p14="http://schemas.microsoft.com/office/powerpoint/2010/main">
+    <mc:Choice Requires="p14">
       <p:transition p14:dur="0" advClick="0" advTm="5000"/>
     </mc:Choice>
-    <mc:Fallback>
+    <mc:Fallback xmlns="">
       <p:transition advClick="0" advTm="5000"/>
     </mc:Fallback>
   </mc:AlternateContent>
@@ -529,11 +529,11 @@
   <p:clrMapOvr>
     <a:masterClrMapping/>
   </p:clrMapOvr>
-  <mc:AlternateContent xmlns:mc="http://schemas.openxmlformats.org/markup-compatibility/2006">
-    <mc:Choice xmlns:p14="http://schemas.microsoft.com/office/powerpoint/2010/main" Requires="p14">
+  <mc:AlternateContent xmlns:mc="http://schemas.openxmlformats.org/markup-compatibility/2006" xmlns:p14="http://schemas.microsoft.com/office/powerpoint/2010/main">
+    <mc:Choice Requires="p14">
       <p:transition p14:dur="0" advClick="0" advTm="5000"/>
     </mc:Choice>
-    <mc:Fallback>
+    <mc:Fallback xmlns="">
       <p:transition advClick="0" advTm="5000"/>
     </mc:Fallback>
   </mc:AlternateContent>
@@ -717,11 +717,11 @@
   <p:clrMapOvr>
     <a:masterClrMapping/>
   </p:clrMapOvr>
-  <mc:AlternateContent xmlns:mc="http://schemas.openxmlformats.org/markup-compatibility/2006">
-    <mc:Choice xmlns:p14="http://schemas.microsoft.com/office/powerpoint/2010/main" Requires="p14">
+  <mc:AlternateContent xmlns:mc="http://schemas.openxmlformats.org/markup-compatibility/2006" xmlns:p14="http://schemas.microsoft.com/office/powerpoint/2010/main">
+    <mc:Choice Requires="p14">
       <p:transition p14:dur="0" advClick="0" advTm="5000"/>
     </mc:Choice>
-    <mc:Fallback>
+    <mc:Fallback xmlns="">
       <p:transition advClick="0" advTm="5000"/>
     </mc:Fallback>
   </mc:AlternateContent>
@@ -895,11 +895,11 @@
   <p:clrMapOvr>
     <a:masterClrMapping/>
   </p:clrMapOvr>
-  <mc:AlternateContent xmlns:mc="http://schemas.openxmlformats.org/markup-compatibility/2006">
-    <mc:Choice xmlns:p14="http://schemas.microsoft.com/office/powerpoint/2010/main" Requires="p14">
+  <mc:AlternateContent xmlns:mc="http://schemas.openxmlformats.org/markup-compatibility/2006" xmlns:p14="http://schemas.microsoft.com/office/powerpoint/2010/main">
+    <mc:Choice Requires="p14">
       <p:transition p14:dur="0" advClick="0" advTm="5000"/>
     </mc:Choice>
-    <mc:Fallback>
+    <mc:Fallback xmlns="">
       <p:transition advClick="0" advTm="5000"/>
     </mc:Fallback>
   </mc:AlternateContent>
@@ -1149,11 +1149,11 @@
   <p:clrMapOvr>
     <a:masterClrMapping/>
   </p:clrMapOvr>
-  <mc:AlternateContent xmlns:mc="http://schemas.openxmlformats.org/markup-compatibility/2006">
-    <mc:Choice xmlns:p14="http://schemas.microsoft.com/office/powerpoint/2010/main" Requires="p14">
+  <mc:AlternateContent xmlns:mc="http://schemas.openxmlformats.org/markup-compatibility/2006" xmlns:p14="http://schemas.microsoft.com/office/powerpoint/2010/main">
+    <mc:Choice Requires="p14">
       <p:transition p14:dur="0" advClick="0" advTm="5000"/>
     </mc:Choice>
-    <mc:Fallback>
+    <mc:Fallback xmlns="">
       <p:transition advClick="0" advTm="5000"/>
     </mc:Fallback>
   </mc:AlternateContent>
@@ -1445,11 +1445,11 @@
   <p:clrMapOvr>
     <a:masterClrMapping/>
   </p:clrMapOvr>
-  <mc:AlternateContent xmlns:mc="http://schemas.openxmlformats.org/markup-compatibility/2006">
-    <mc:Choice xmlns:p14="http://schemas.microsoft.com/office/powerpoint/2010/main" Requires="p14">
+  <mc:AlternateContent xmlns:mc="http://schemas.openxmlformats.org/markup-compatibility/2006" xmlns:p14="http://schemas.microsoft.com/office/powerpoint/2010/main">
+    <mc:Choice Requires="p14">
       <p:transition p14:dur="0" advClick="0" advTm="5000"/>
     </mc:Choice>
-    <mc:Fallback>
+    <mc:Fallback xmlns="">
       <p:transition advClick="0" advTm="5000"/>
     </mc:Fallback>
   </mc:AlternateContent>
@@ -1875,11 +1875,11 @@
   <p:clrMapOvr>
     <a:masterClrMapping/>
   </p:clrMapOvr>
-  <mc:AlternateContent xmlns:mc="http://schemas.openxmlformats.org/markup-compatibility/2006">
-    <mc:Choice xmlns:p14="http://schemas.microsoft.com/office/powerpoint/2010/main" Requires="p14">
+  <mc:AlternateContent xmlns:mc="http://schemas.openxmlformats.org/markup-compatibility/2006" xmlns:p14="http://schemas.microsoft.com/office/powerpoint/2010/main">
+    <mc:Choice Requires="p14">
       <p:transition p14:dur="0" advClick="0" advTm="5000"/>
     </mc:Choice>
-    <mc:Fallback>
+    <mc:Fallback xmlns="">
       <p:transition advClick="0" advTm="5000"/>
     </mc:Fallback>
   </mc:AlternateContent>
@@ -2001,11 +2001,11 @@
   <p:clrMapOvr>
     <a:masterClrMapping/>
   </p:clrMapOvr>
-  <mc:AlternateContent xmlns:mc="http://schemas.openxmlformats.org/markup-compatibility/2006">
-    <mc:Choice xmlns:p14="http://schemas.microsoft.com/office/powerpoint/2010/main" Requires="p14">
+  <mc:AlternateContent xmlns:mc="http://schemas.openxmlformats.org/markup-compatibility/2006" xmlns:p14="http://schemas.microsoft.com/office/powerpoint/2010/main">
+    <mc:Choice Requires="p14">
       <p:transition p14:dur="0" advClick="0" advTm="5000"/>
     </mc:Choice>
-    <mc:Fallback>
+    <mc:Fallback xmlns="">
       <p:transition advClick="0" advTm="5000"/>
     </mc:Fallback>
   </mc:AlternateContent>
@@ -2104,11 +2104,11 @@
   <p:clrMapOvr>
     <a:masterClrMapping/>
   </p:clrMapOvr>
-  <mc:AlternateContent xmlns:mc="http://schemas.openxmlformats.org/markup-compatibility/2006">
-    <mc:Choice xmlns:p14="http://schemas.microsoft.com/office/powerpoint/2010/main" Requires="p14">
+  <mc:AlternateContent xmlns:mc="http://schemas.openxmlformats.org/markup-compatibility/2006" xmlns:p14="http://schemas.microsoft.com/office/powerpoint/2010/main">
+    <mc:Choice Requires="p14">
       <p:transition p14:dur="0" advClick="0" advTm="5000"/>
     </mc:Choice>
-    <mc:Fallback>
+    <mc:Fallback xmlns="">
       <p:transition advClick="0" advTm="5000"/>
     </mc:Fallback>
   </mc:AlternateContent>
@@ -2389,11 +2389,11 @@
   <p:clrMapOvr>
     <a:masterClrMapping/>
   </p:clrMapOvr>
-  <mc:AlternateContent xmlns:mc="http://schemas.openxmlformats.org/markup-compatibility/2006">
-    <mc:Choice xmlns:p14="http://schemas.microsoft.com/office/powerpoint/2010/main" Requires="p14">
+  <mc:AlternateContent xmlns:mc="http://schemas.openxmlformats.org/markup-compatibility/2006" xmlns:p14="http://schemas.microsoft.com/office/powerpoint/2010/main">
+    <mc:Choice Requires="p14">
       <p:transition p14:dur="0" advClick="0" advTm="5000"/>
     </mc:Choice>
-    <mc:Fallback>
+    <mc:Fallback xmlns="">
       <p:transition advClick="0" advTm="5000"/>
     </mc:Fallback>
   </mc:AlternateContent>
@@ -2650,11 +2650,11 @@
   <p:clrMapOvr>
     <a:masterClrMapping/>
   </p:clrMapOvr>
-  <mc:AlternateContent xmlns:mc="http://schemas.openxmlformats.org/markup-compatibility/2006">
-    <mc:Choice xmlns:p14="http://schemas.microsoft.com/office/powerpoint/2010/main" Requires="p14">
+  <mc:AlternateContent xmlns:mc="http://schemas.openxmlformats.org/markup-compatibility/2006" xmlns:p14="http://schemas.microsoft.com/office/powerpoint/2010/main">
+    <mc:Choice Requires="p14">
       <p:transition p14:dur="0" advClick="0" advTm="5000"/>
     </mc:Choice>
-    <mc:Fallback>
+    <mc:Fallback xmlns="">
       <p:transition advClick="0" advTm="5000"/>
     </mc:Fallback>
   </mc:AlternateContent>
@@ -2918,11 +2918,11 @@
     <p:sldLayoutId id="2147483658" r:id="rId10"/>
     <p:sldLayoutId id="2147483659" r:id="rId11"/>
   </p:sldLayoutIdLst>
-  <mc:AlternateContent xmlns:mc="http://schemas.openxmlformats.org/markup-compatibility/2006">
-    <mc:Choice xmlns:p14="http://schemas.microsoft.com/office/powerpoint/2010/main" Requires="p14">
+  <mc:AlternateContent xmlns:mc="http://schemas.openxmlformats.org/markup-compatibility/2006" xmlns:p14="http://schemas.microsoft.com/office/powerpoint/2010/main">
+    <mc:Choice Requires="p14">
       <p:transition p14:dur="0" advClick="0" advTm="5000"/>
     </mc:Choice>
-    <mc:Fallback>
+    <mc:Fallback xmlns="">
       <p:transition advClick="0" advTm="5000"/>
     </mc:Fallback>
   </mc:AlternateContent>
@@ -3335,11 +3335,11 @@
   <p:clrMapOvr>
     <a:masterClrMapping/>
   </p:clrMapOvr>
-  <mc:AlternateContent xmlns:mc="http://schemas.openxmlformats.org/markup-compatibility/2006">
-    <mc:Choice xmlns:p14="http://schemas.microsoft.com/office/powerpoint/2010/main" Requires="p14">
+  <mc:AlternateContent xmlns:mc="http://schemas.openxmlformats.org/markup-compatibility/2006" xmlns:p14="http://schemas.microsoft.com/office/powerpoint/2010/main">
+    <mc:Choice Requires="p14">
       <p:transition p14:dur="0" advClick="0"/>
     </mc:Choice>
-    <mc:Fallback>
+    <mc:Fallback xmlns="">
       <p:transition advClick="0"/>
     </mc:Fallback>
   </mc:AlternateContent>
@@ -3519,11 +3519,11 @@
   <p:clrMapOvr>
     <a:masterClrMapping/>
   </p:clrMapOvr>
-  <mc:AlternateContent xmlns:mc="http://schemas.openxmlformats.org/markup-compatibility/2006">
-    <mc:Choice xmlns:p14="http://schemas.microsoft.com/office/powerpoint/2010/main" Requires="p14">
+  <mc:AlternateContent xmlns:mc="http://schemas.openxmlformats.org/markup-compatibility/2006" xmlns:p14="http://schemas.microsoft.com/office/powerpoint/2010/main">
+    <mc:Choice Requires="p14">
       <p:transition p14:dur="0" advClick="0" advTm="5000"/>
     </mc:Choice>
-    <mc:Fallback>
+    <mc:Fallback xmlns="">
       <p:transition advClick="0" advTm="5000"/>
     </mc:Fallback>
   </mc:AlternateContent>
@@ -3587,11 +3587,11 @@
   <p:clrMapOvr>
     <a:masterClrMapping/>
   </p:clrMapOvr>
-  <mc:AlternateContent xmlns:mc="http://schemas.openxmlformats.org/markup-compatibility/2006">
-    <mc:Choice xmlns:p14="http://schemas.microsoft.com/office/powerpoint/2010/main" Requires="p14">
+  <mc:AlternateContent xmlns:mc="http://schemas.openxmlformats.org/markup-compatibility/2006" xmlns:p14="http://schemas.microsoft.com/office/powerpoint/2010/main">
+    <mc:Choice Requires="p14">
       <p:transition p14:dur="0" advClick="0" advTm="5000"/>
     </mc:Choice>
-    <mc:Fallback>
+    <mc:Fallback xmlns="">
       <p:transition advClick="0" advTm="5000"/>
     </mc:Fallback>
   </mc:AlternateContent>
@@ -3716,11 +3716,11 @@
   <p:clrMapOvr>
     <a:masterClrMapping/>
   </p:clrMapOvr>
-  <mc:AlternateContent xmlns:mc="http://schemas.openxmlformats.org/markup-compatibility/2006">
-    <mc:Choice xmlns:p14="http://schemas.microsoft.com/office/powerpoint/2010/main" Requires="p14">
+  <mc:AlternateContent xmlns:mc="http://schemas.openxmlformats.org/markup-compatibility/2006" xmlns:p14="http://schemas.microsoft.com/office/powerpoint/2010/main">
+    <mc:Choice Requires="p14">
       <p:transition p14:dur="0" advClick="0"/>
     </mc:Choice>
-    <mc:Fallback>
+    <mc:Fallback xmlns="">
       <p:transition advClick="0"/>
     </mc:Fallback>
   </mc:AlternateContent>
@@ -3805,8 +3805,9 @@
             <a:pPr lvl="1"/>
             <a:r>
               <a:rPr lang="en-GB" b="1" dirty="0" smtClean="0"/>
-              <a:t>Home page</a:t>
-            </a:r>
+              <a:t>View models</a:t>
+            </a:r>
+            <a:endParaRPr lang="en-GB" b="1" dirty="0" smtClean="0"/>
           </a:p>
           <a:p>
             <a:pPr lvl="1"/>
@@ -4226,11 +4227,11 @@
   <p:clrMapOvr>
     <a:masterClrMapping/>
   </p:clrMapOvr>
-  <mc:AlternateContent xmlns:mc="http://schemas.openxmlformats.org/markup-compatibility/2006">
-    <mc:Choice xmlns:p14="http://schemas.microsoft.com/office/powerpoint/2010/main" Requires="p14">
+  <mc:AlternateContent xmlns:mc="http://schemas.openxmlformats.org/markup-compatibility/2006" xmlns:p14="http://schemas.microsoft.com/office/powerpoint/2010/main">
+    <mc:Choice Requires="p14">
       <p:transition p14:dur="0" advClick="0"/>
     </mc:Choice>
-    <mc:Fallback>
+    <mc:Fallback xmlns="">
       <p:transition advClick="0"/>
     </mc:Fallback>
   </mc:AlternateContent>
@@ -4543,11 +4544,11 @@
   <p:clrMapOvr>
     <a:masterClrMapping/>
   </p:clrMapOvr>
-  <mc:AlternateContent xmlns:mc="http://schemas.openxmlformats.org/markup-compatibility/2006">
-    <mc:Choice xmlns:p14="http://schemas.microsoft.com/office/powerpoint/2010/main" Requires="p14">
+  <mc:AlternateContent xmlns:mc="http://schemas.openxmlformats.org/markup-compatibility/2006" xmlns:p14="http://schemas.microsoft.com/office/powerpoint/2010/main">
+    <mc:Choice Requires="p14">
       <p:transition p14:dur="0" advClick="0"/>
     </mc:Choice>
-    <mc:Fallback>
+    <mc:Fallback xmlns="">
       <p:transition advClick="0"/>
     </mc:Fallback>
   </mc:AlternateContent>

</xml_diff>